<commit_message>
update Audatex presentation slides
</commit_message>
<xml_diff>
--- a/Report/Audatex-翱特.pptx
+++ b/Report/Audatex-翱特.pptx
@@ -12,6 +12,9 @@
     <p:sldId id="259" r:id="rId6"/>
     <p:sldId id="260" r:id="rId7"/>
     <p:sldId id="262" r:id="rId8"/>
+    <p:sldId id="263" r:id="rId9"/>
+    <p:sldId id="265" r:id="rId10"/>
+    <p:sldId id="266" r:id="rId11"/>
   </p:sldIdLst>
   <p:sldSz cx="12192000" cy="6858000"/>
   <p:notesSz cx="6858000" cy="9144000"/>
@@ -110,6 +113,26 @@
       </a:defRPr>
     </a:lvl9pPr>
   </p:defaultTextStyle>
+  <p:extLst>
+    <p:ext uri="{521415D9-36F7-43E2-AB2F-B90AF26B5E84}">
+      <p14:sectionLst xmlns:p14="http://schemas.microsoft.com/office/powerpoint/2010/main">
+        <p14:section name="默认节" id="{ED2D0DF4-D083-4655-9BA2-919316C766C5}">
+          <p14:sldIdLst>
+            <p14:sldId id="256"/>
+            <p14:sldId id="257"/>
+            <p14:sldId id="258"/>
+            <p14:sldId id="261"/>
+            <p14:sldId id="259"/>
+            <p14:sldId id="260"/>
+            <p14:sldId id="262"/>
+            <p14:sldId id="263"/>
+            <p14:sldId id="265"/>
+            <p14:sldId id="266"/>
+          </p14:sldIdLst>
+        </p14:section>
+      </p14:sectionLst>
+    </p:ext>
+  </p:extLst>
 </p:presentation>
 </file>
 
@@ -244,7 +267,7 @@
           <a:p>
             <a:fld id="{F2730031-10B4-7248-8A6A-AC3B14A91961}" type="datetimeFigureOut">
               <a:rPr lang="en-US" smtClean="0"/>
-              <a:t>8/13/17</a:t>
+              <a:t>8/14/2017</a:t>
             </a:fld>
             <a:endParaRPr lang="en-US"/>
           </a:p>
@@ -414,7 +437,7 @@
           <a:p>
             <a:fld id="{F2730031-10B4-7248-8A6A-AC3B14A91961}" type="datetimeFigureOut">
               <a:rPr lang="en-US" smtClean="0"/>
-              <a:t>8/13/17</a:t>
+              <a:t>8/14/2017</a:t>
             </a:fld>
             <a:endParaRPr lang="en-US"/>
           </a:p>
@@ -594,7 +617,7 @@
           <a:p>
             <a:fld id="{F2730031-10B4-7248-8A6A-AC3B14A91961}" type="datetimeFigureOut">
               <a:rPr lang="en-US" smtClean="0"/>
-              <a:t>8/13/17</a:t>
+              <a:t>8/14/2017</a:t>
             </a:fld>
             <a:endParaRPr lang="en-US"/>
           </a:p>
@@ -764,7 +787,7 @@
           <a:p>
             <a:fld id="{F2730031-10B4-7248-8A6A-AC3B14A91961}" type="datetimeFigureOut">
               <a:rPr lang="en-US" smtClean="0"/>
-              <a:t>8/13/17</a:t>
+              <a:t>8/14/2017</a:t>
             </a:fld>
             <a:endParaRPr lang="en-US"/>
           </a:p>
@@ -1010,7 +1033,7 @@
           <a:p>
             <a:fld id="{F2730031-10B4-7248-8A6A-AC3B14A91961}" type="datetimeFigureOut">
               <a:rPr lang="en-US" smtClean="0"/>
-              <a:t>8/13/17</a:t>
+              <a:t>8/14/2017</a:t>
             </a:fld>
             <a:endParaRPr lang="en-US"/>
           </a:p>
@@ -1242,7 +1265,7 @@
           <a:p>
             <a:fld id="{F2730031-10B4-7248-8A6A-AC3B14A91961}" type="datetimeFigureOut">
               <a:rPr lang="en-US" smtClean="0"/>
-              <a:t>8/13/17</a:t>
+              <a:t>8/14/2017</a:t>
             </a:fld>
             <a:endParaRPr lang="en-US"/>
           </a:p>
@@ -1609,7 +1632,7 @@
           <a:p>
             <a:fld id="{F2730031-10B4-7248-8A6A-AC3B14A91961}" type="datetimeFigureOut">
               <a:rPr lang="en-US" smtClean="0"/>
-              <a:t>8/13/17</a:t>
+              <a:t>8/14/2017</a:t>
             </a:fld>
             <a:endParaRPr lang="en-US"/>
           </a:p>
@@ -1727,7 +1750,7 @@
           <a:p>
             <a:fld id="{F2730031-10B4-7248-8A6A-AC3B14A91961}" type="datetimeFigureOut">
               <a:rPr lang="en-US" smtClean="0"/>
-              <a:t>8/13/17</a:t>
+              <a:t>8/14/2017</a:t>
             </a:fld>
             <a:endParaRPr lang="en-US"/>
           </a:p>
@@ -1822,7 +1845,7 @@
           <a:p>
             <a:fld id="{F2730031-10B4-7248-8A6A-AC3B14A91961}" type="datetimeFigureOut">
               <a:rPr lang="en-US" smtClean="0"/>
-              <a:t>8/13/17</a:t>
+              <a:t>8/14/2017</a:t>
             </a:fld>
             <a:endParaRPr lang="en-US"/>
           </a:p>
@@ -2099,7 +2122,7 @@
           <a:p>
             <a:fld id="{F2730031-10B4-7248-8A6A-AC3B14A91961}" type="datetimeFigureOut">
               <a:rPr lang="en-US" smtClean="0"/>
-              <a:t>8/13/17</a:t>
+              <a:t>8/14/2017</a:t>
             </a:fld>
             <a:endParaRPr lang="en-US"/>
           </a:p>
@@ -2352,7 +2375,7 @@
           <a:p>
             <a:fld id="{F2730031-10B4-7248-8A6A-AC3B14A91961}" type="datetimeFigureOut">
               <a:rPr lang="en-US" smtClean="0"/>
-              <a:t>8/13/17</a:t>
+              <a:t>8/14/2017</a:t>
             </a:fld>
             <a:endParaRPr lang="en-US"/>
           </a:p>
@@ -2565,7 +2588,7 @@
           <a:p>
             <a:fld id="{F2730031-10B4-7248-8A6A-AC3B14A91961}" type="datetimeFigureOut">
               <a:rPr lang="en-US" smtClean="0"/>
-              <a:t>8/13/17</a:t>
+              <a:t>8/14/2017</a:t>
             </a:fld>
             <a:endParaRPr lang="en-US"/>
           </a:p>
@@ -3042,6 +3065,65 @@
 </p:sld>
 </file>
 
+<file path=ppt/slides/slide10.xml><?xml version="1.0" encoding="utf-8"?>
+<p:sld xmlns:a="http://schemas.openxmlformats.org/drawingml/2006/main" xmlns:r="http://schemas.openxmlformats.org/officeDocument/2006/relationships" xmlns:p="http://schemas.openxmlformats.org/presentationml/2006/main">
+  <p:cSld>
+    <p:spTree>
+      <p:nvGrpSpPr>
+        <p:cNvPr id="1" name=""/>
+        <p:cNvGrpSpPr/>
+        <p:nvPr/>
+      </p:nvGrpSpPr>
+      <p:grpSpPr>
+        <a:xfrm>
+          <a:off x="0" y="0"/>
+          <a:ext cx="0" cy="0"/>
+          <a:chOff x="0" y="0"/>
+          <a:chExt cx="0" cy="0"/>
+        </a:xfrm>
+      </p:grpSpPr>
+      <p:sp>
+        <p:nvSpPr>
+          <p:cNvPr id="2" name="标题 1"/>
+          <p:cNvSpPr>
+            <a:spLocks noGrp="1"/>
+          </p:cNvSpPr>
+          <p:nvPr>
+            <p:ph type="title"/>
+          </p:nvPr>
+        </p:nvSpPr>
+        <p:spPr>
+          <a:xfrm>
+            <a:off x="678809" y="2688875"/>
+            <a:ext cx="10515600" cy="1325563"/>
+          </a:xfrm>
+        </p:spPr>
+        <p:txBody>
+          <a:bodyPr/>
+          <a:lstStyle/>
+          <a:p>
+            <a:pPr algn="ctr"/>
+            <a:r>
+              <a:rPr lang="zh-CN" altLang="en-US" dirty="0" smtClean="0"/>
+              <a:t>谢谢！</a:t>
+            </a:r>
+            <a:endParaRPr lang="zh-CN" altLang="en-US" dirty="0"/>
+          </a:p>
+        </p:txBody>
+      </p:sp>
+    </p:spTree>
+    <p:extLst>
+      <p:ext uri="{BB962C8B-B14F-4D97-AF65-F5344CB8AC3E}">
+        <p14:creationId xmlns:p14="http://schemas.microsoft.com/office/powerpoint/2010/main" val="2997902231"/>
+      </p:ext>
+    </p:extLst>
+  </p:cSld>
+  <p:clrMapOvr>
+    <a:masterClrMapping/>
+  </p:clrMapOvr>
+</p:sld>
+</file>
+
 <file path=ppt/slides/slide2.xml><?xml version="1.0" encoding="utf-8"?>
 <p:sld xmlns:a="http://schemas.openxmlformats.org/drawingml/2006/main" xmlns:r="http://schemas.openxmlformats.org/officeDocument/2006/relationships" xmlns:p="http://schemas.openxmlformats.org/presentationml/2006/main">
   <p:cSld>
@@ -3748,15 +3830,7 @@
                   <a:schemeClr val="accent2"/>
                 </a:solidFill>
               </a:rPr>
-              <a:t>人工</a:t>
-            </a:r>
-            <a:r>
-              <a:rPr lang="zh-CN" altLang="en-US" dirty="0" smtClean="0">
-                <a:solidFill>
-                  <a:schemeClr val="accent2"/>
-                </a:solidFill>
-              </a:rPr>
-              <a:t>（</a:t>
+              <a:t>人工（</a:t>
             </a:r>
             <a:r>
               <a:rPr lang="en-US" altLang="zh-CN" dirty="0" smtClean="0">
@@ -3915,6 +3989,13 @@
   <p:clrMapOvr>
     <a:masterClrMapping/>
   </p:clrMapOvr>
+  <p:timing>
+    <p:tnLst>
+      <p:par>
+        <p:cTn id="1" dur="indefinite" restart="never" nodeType="tmRoot"/>
+      </p:par>
+    </p:tnLst>
+  </p:timing>
 </p:sld>
 </file>
 
@@ -4488,11 +4569,7 @@
             </a:r>
             <a:r>
               <a:rPr lang="en-US" altLang="zh-CN" sz="2000" dirty="0" smtClean="0"/>
-              <a:t>Parts</a:t>
-            </a:r>
-            <a:r>
-              <a:rPr lang="en-US" altLang="zh-CN" sz="2000" dirty="0" smtClean="0"/>
-              <a:t>)</a:t>
+              <a:t>Parts)</a:t>
             </a:r>
           </a:p>
           <a:p>
@@ -4549,6 +4626,13 @@
   <p:clrMapOvr>
     <a:masterClrMapping/>
   </p:clrMapOvr>
+  <p:timing>
+    <p:tnLst>
+      <p:par>
+        <p:cTn id="1" dur="indefinite" restart="never" nodeType="tmRoot"/>
+      </p:par>
+    </p:tnLst>
+  </p:timing>
 </p:sld>
 </file>
 
@@ -4698,6 +4782,313 @@
     <p:extLst>
       <p:ext uri="{BB962C8B-B14F-4D97-AF65-F5344CB8AC3E}">
         <p14:creationId xmlns:p14="http://schemas.microsoft.com/office/powerpoint/2010/main" val="780328245"/>
+      </p:ext>
+    </p:extLst>
+  </p:cSld>
+  <p:clrMapOvr>
+    <a:masterClrMapping/>
+  </p:clrMapOvr>
+  <p:timing>
+    <p:tnLst>
+      <p:par>
+        <p:cTn id="1" dur="indefinite" restart="never" nodeType="tmRoot"/>
+      </p:par>
+    </p:tnLst>
+  </p:timing>
+</p:sld>
+</file>
+
+<file path=ppt/slides/slide8.xml><?xml version="1.0" encoding="utf-8"?>
+<p:sld xmlns:a="http://schemas.openxmlformats.org/drawingml/2006/main" xmlns:r="http://schemas.openxmlformats.org/officeDocument/2006/relationships" xmlns:p="http://schemas.openxmlformats.org/presentationml/2006/main">
+  <p:cSld>
+    <p:spTree>
+      <p:nvGrpSpPr>
+        <p:cNvPr id="1" name=""/>
+        <p:cNvGrpSpPr/>
+        <p:nvPr/>
+      </p:nvGrpSpPr>
+      <p:grpSpPr>
+        <a:xfrm>
+          <a:off x="0" y="0"/>
+          <a:ext cx="0" cy="0"/>
+          <a:chOff x="0" y="0"/>
+          <a:chExt cx="0" cy="0"/>
+        </a:xfrm>
+      </p:grpSpPr>
+      <p:sp>
+        <p:nvSpPr>
+          <p:cNvPr id="2" name="标题 1"/>
+          <p:cNvSpPr>
+            <a:spLocks noGrp="1"/>
+          </p:cNvSpPr>
+          <p:nvPr>
+            <p:ph type="title"/>
+          </p:nvPr>
+        </p:nvSpPr>
+        <p:spPr/>
+        <p:txBody>
+          <a:bodyPr/>
+          <a:lstStyle/>
+          <a:p>
+            <a:r>
+              <a:rPr lang="zh-CN" altLang="en-US" dirty="0"/>
+              <a:t>订单</a:t>
+            </a:r>
+            <a:r>
+              <a:rPr lang="zh-CN" altLang="en-US" dirty="0" smtClean="0"/>
+              <a:t>跟踪</a:t>
+            </a:r>
+            <a:r>
+              <a:rPr lang="en-US" altLang="zh-CN" dirty="0" smtClean="0"/>
+              <a:t>(Orders Tracking)</a:t>
+            </a:r>
+            <a:endParaRPr lang="zh-CN" altLang="en-US" dirty="0"/>
+          </a:p>
+        </p:txBody>
+      </p:sp>
+      <p:sp>
+        <p:nvSpPr>
+          <p:cNvPr id="3" name="内容占位符 2"/>
+          <p:cNvSpPr>
+            <a:spLocks noGrp="1"/>
+          </p:cNvSpPr>
+          <p:nvPr>
+            <p:ph idx="1"/>
+          </p:nvPr>
+        </p:nvSpPr>
+        <p:spPr/>
+        <p:txBody>
+          <a:bodyPr/>
+          <a:lstStyle/>
+          <a:p>
+            <a:r>
+              <a:rPr lang="zh-CN" altLang="en-US" dirty="0" smtClean="0"/>
+              <a:t>采购</a:t>
+            </a:r>
+            <a:r>
+              <a:rPr lang="en-US" altLang="zh-CN" dirty="0" smtClean="0"/>
+              <a:t>(Purchasing)</a:t>
+            </a:r>
+          </a:p>
+          <a:p>
+            <a:pPr lvl="1"/>
+            <a:r>
+              <a:rPr lang="zh-CN" altLang="en-US" dirty="0" smtClean="0"/>
+              <a:t>由供应链团队开发全国及本地供应商</a:t>
+            </a:r>
+            <a:r>
+              <a:rPr lang="en-US" altLang="zh-CN" dirty="0" smtClean="0"/>
+              <a:t>——</a:t>
+            </a:r>
+            <a:r>
+              <a:rPr lang="zh-CN" altLang="en-US" dirty="0" smtClean="0"/>
+              <a:t>约</a:t>
+            </a:r>
+            <a:r>
+              <a:rPr lang="en-US" altLang="zh-CN" dirty="0" smtClean="0"/>
+              <a:t>5</a:t>
+            </a:r>
+            <a:r>
+              <a:rPr lang="zh-CN" altLang="en-US" dirty="0" smtClean="0"/>
+              <a:t>人</a:t>
+            </a:r>
+            <a:r>
+              <a:rPr lang="en-US" altLang="zh-CN" dirty="0" smtClean="0"/>
+              <a:t>(5 FTEs)</a:t>
+            </a:r>
+          </a:p>
+          <a:p>
+            <a:pPr lvl="1"/>
+            <a:r>
+              <a:rPr lang="zh-CN" altLang="en-US" dirty="0" smtClean="0"/>
+              <a:t>由当地客户经理负责与修理厂沟通下单购买</a:t>
+            </a:r>
+            <a:r>
+              <a:rPr lang="en-US" altLang="zh-CN" dirty="0" smtClean="0"/>
+              <a:t>——</a:t>
+            </a:r>
+            <a:r>
+              <a:rPr lang="zh-CN" altLang="en-US" dirty="0" smtClean="0"/>
+              <a:t>每地市一人</a:t>
+            </a:r>
+            <a:endParaRPr lang="en-US" altLang="zh-CN" dirty="0" smtClean="0"/>
+          </a:p>
+          <a:p>
+            <a:r>
+              <a:rPr lang="zh-CN" altLang="en-US" dirty="0" smtClean="0"/>
+              <a:t>跟踪</a:t>
+            </a:r>
+            <a:r>
+              <a:rPr lang="en-US" altLang="zh-CN" dirty="0" smtClean="0"/>
+              <a:t>(Tracking)</a:t>
+            </a:r>
+          </a:p>
+          <a:p>
+            <a:pPr lvl="1"/>
+            <a:r>
+              <a:rPr lang="zh-CN" altLang="en-US" dirty="0" smtClean="0"/>
+              <a:t>由接单客服人员跟踪修理厂下单后的支付、物流等流程</a:t>
+            </a:r>
+            <a:r>
+              <a:rPr lang="en-US" altLang="zh-CN" dirty="0" smtClean="0"/>
+              <a:t>——</a:t>
+            </a:r>
+            <a:r>
+              <a:rPr lang="zh-CN" altLang="en-US" dirty="0" smtClean="0"/>
+              <a:t>约</a:t>
+            </a:r>
+            <a:r>
+              <a:rPr lang="en-US" altLang="zh-CN" dirty="0" smtClean="0"/>
+              <a:t>10-15</a:t>
+            </a:r>
+            <a:r>
+              <a:rPr lang="zh-CN" altLang="en-US" dirty="0" smtClean="0"/>
+              <a:t>人</a:t>
+            </a:r>
+            <a:r>
+              <a:rPr lang="en-US" altLang="zh-CN" dirty="0" smtClean="0"/>
+              <a:t>(Customer Service Center)</a:t>
+            </a:r>
+          </a:p>
+        </p:txBody>
+      </p:sp>
+    </p:spTree>
+    <p:extLst>
+      <p:ext uri="{BB962C8B-B14F-4D97-AF65-F5344CB8AC3E}">
+        <p14:creationId xmlns:p14="http://schemas.microsoft.com/office/powerpoint/2010/main" val="2266711927"/>
+      </p:ext>
+    </p:extLst>
+  </p:cSld>
+  <p:clrMapOvr>
+    <a:masterClrMapping/>
+  </p:clrMapOvr>
+</p:sld>
+</file>
+
+<file path=ppt/slides/slide9.xml><?xml version="1.0" encoding="utf-8"?>
+<p:sld xmlns:a="http://schemas.openxmlformats.org/drawingml/2006/main" xmlns:r="http://schemas.openxmlformats.org/officeDocument/2006/relationships" xmlns:p="http://schemas.openxmlformats.org/presentationml/2006/main">
+  <p:cSld>
+    <p:spTree>
+      <p:nvGrpSpPr>
+        <p:cNvPr id="1" name=""/>
+        <p:cNvGrpSpPr/>
+        <p:nvPr/>
+      </p:nvGrpSpPr>
+      <p:grpSpPr>
+        <a:xfrm>
+          <a:off x="0" y="0"/>
+          <a:ext cx="0" cy="0"/>
+          <a:chOff x="0" y="0"/>
+          <a:chExt cx="0" cy="0"/>
+        </a:xfrm>
+      </p:grpSpPr>
+      <p:sp>
+        <p:nvSpPr>
+          <p:cNvPr id="2" name="标题 1"/>
+          <p:cNvSpPr>
+            <a:spLocks noGrp="1"/>
+          </p:cNvSpPr>
+          <p:nvPr>
+            <p:ph type="title"/>
+          </p:nvPr>
+        </p:nvSpPr>
+        <p:spPr/>
+        <p:txBody>
+          <a:bodyPr/>
+          <a:lstStyle/>
+          <a:p>
+            <a:r>
+              <a:rPr lang="zh-CN" altLang="en-US" dirty="0" smtClean="0"/>
+              <a:t>货运流程</a:t>
+            </a:r>
+            <a:r>
+              <a:rPr lang="en-US" altLang="zh-CN" dirty="0" smtClean="0"/>
+              <a:t>(Procurement Process)</a:t>
+            </a:r>
+            <a:endParaRPr lang="zh-CN" altLang="en-US" dirty="0"/>
+          </a:p>
+        </p:txBody>
+      </p:sp>
+      <p:sp>
+        <p:nvSpPr>
+          <p:cNvPr id="3" name="内容占位符 2"/>
+          <p:cNvSpPr>
+            <a:spLocks noGrp="1"/>
+          </p:cNvSpPr>
+          <p:nvPr>
+            <p:ph idx="1"/>
+          </p:nvPr>
+        </p:nvSpPr>
+        <p:spPr/>
+        <p:txBody>
+          <a:bodyPr/>
+          <a:lstStyle/>
+          <a:p>
+            <a:r>
+              <a:rPr lang="zh-CN" altLang="en-US" dirty="0" smtClean="0"/>
+              <a:t>目前状态</a:t>
+            </a:r>
+            <a:r>
+              <a:rPr lang="en-US" altLang="zh-CN" dirty="0" smtClean="0"/>
+              <a:t>(Current Status)</a:t>
+            </a:r>
+          </a:p>
+          <a:p>
+            <a:pPr lvl="1"/>
+            <a:r>
+              <a:rPr lang="zh-CN" altLang="en-US" dirty="0"/>
+              <a:t>供应</a:t>
+            </a:r>
+            <a:r>
+              <a:rPr lang="zh-CN" altLang="en-US" dirty="0" smtClean="0"/>
+              <a:t>商自行备货、发货、配送，并向平台推送“已发货”通知</a:t>
+            </a:r>
+            <a:endParaRPr lang="en-US" altLang="zh-CN" dirty="0"/>
+          </a:p>
+          <a:p>
+            <a:pPr lvl="1"/>
+            <a:r>
+              <a:rPr lang="zh-CN" altLang="en-US" dirty="0" smtClean="0"/>
+              <a:t>修理厂收货及验货完毕后，告知平台“已收货”</a:t>
+            </a:r>
+            <a:endParaRPr lang="en-US" altLang="zh-CN" dirty="0" smtClean="0"/>
+          </a:p>
+          <a:p>
+            <a:r>
+              <a:rPr lang="zh-CN" altLang="en-US" dirty="0" smtClean="0"/>
+              <a:t>未来愿景</a:t>
+            </a:r>
+            <a:r>
+              <a:rPr lang="en-US" altLang="zh-CN" dirty="0" smtClean="0"/>
+              <a:t>(Prospect)</a:t>
+            </a:r>
+          </a:p>
+          <a:p>
+            <a:pPr lvl="1"/>
+            <a:r>
+              <a:rPr lang="zh-CN" altLang="en-US" dirty="0" smtClean="0"/>
+              <a:t>平台在各省自建实体中心仓库，供应商将部分货物（货权仍归属供应商）存储在中心仓，由平台物流统一配送</a:t>
+            </a:r>
+            <a:endParaRPr lang="en-US" altLang="zh-CN" dirty="0" smtClean="0"/>
+          </a:p>
+          <a:p>
+            <a:pPr lvl="1"/>
+            <a:r>
+              <a:rPr lang="zh-CN" altLang="en-US" dirty="0" smtClean="0"/>
+              <a:t>建立云仓系统，实时管理供应商虚拟库存</a:t>
+            </a:r>
+            <a:endParaRPr lang="en-US" altLang="zh-CN" dirty="0" smtClean="0"/>
+          </a:p>
+          <a:p>
+            <a:pPr lvl="1"/>
+            <a:endParaRPr lang="zh-CN" altLang="en-US" dirty="0"/>
+          </a:p>
+        </p:txBody>
+      </p:sp>
+    </p:spTree>
+    <p:extLst>
+      <p:ext uri="{BB962C8B-B14F-4D97-AF65-F5344CB8AC3E}">
+        <p14:creationId xmlns:p14="http://schemas.microsoft.com/office/powerpoint/2010/main" val="4118894032"/>
       </p:ext>
     </p:extLst>
   </p:cSld>
@@ -4750,7 +5141,7 @@
     </a:clrScheme>
     <a:fontScheme name="Office">
       <a:majorFont>
-        <a:latin typeface="Calibri Light" panose="020F0302020204030204"/>
+        <a:latin typeface="Calibri Light"/>
         <a:ea typeface=""/>
         <a:cs typeface=""/>
         <a:font script="Jpan" typeface="Yu Gothic Light"/>
@@ -4785,7 +5176,7 @@
         <a:font script="Geor" typeface="Sylfaen"/>
       </a:majorFont>
       <a:minorFont>
-        <a:latin typeface="Calibri" panose="020F0502020204030204"/>
+        <a:latin typeface="Calibri"/>
         <a:ea typeface=""/>
         <a:cs typeface=""/>
         <a:font script="Jpan" typeface="Yu Gothic"/>
@@ -4962,7 +5353,7 @@
   <a:extraClrSchemeLst/>
   <a:extLst>
     <a:ext uri="{05A4C25C-085E-4340-85A3-A5531E510DB2}">
-      <thm15:themeFamily xmlns:thm15="http://schemas.microsoft.com/office/thememl/2012/main" name="Office Theme" id="{62F939B6-93AF-4DB8-9C6B-D6C7DFDC589F}" vid="{4A3C46E8-61CC-4603-A589-7422A47A8E4A}"/>
+      <thm15:themeFamily xmlns:thm15="http://schemas.microsoft.com/office/thememl/2012/main" xmlns="" name="Office Theme" id="{62F939B6-93AF-4DB8-9C6B-D6C7DFDC589F}" vid="{4A3C46E8-61CC-4603-A589-7422A47A8E4A}"/>
     </a:ext>
   </a:extLst>
 </a:theme>

</xml_diff>

<commit_message>
Update Audatex presentation rules
</commit_message>
<xml_diff>
--- a/Report/Audatex-翱特.pptx
+++ b/Report/Audatex-翱特.pptx
@@ -12,9 +12,10 @@
     <p:sldId id="259" r:id="rId6"/>
     <p:sldId id="260" r:id="rId7"/>
     <p:sldId id="262" r:id="rId8"/>
-    <p:sldId id="263" r:id="rId9"/>
-    <p:sldId id="265" r:id="rId10"/>
-    <p:sldId id="266" r:id="rId11"/>
+    <p:sldId id="267" r:id="rId9"/>
+    <p:sldId id="263" r:id="rId10"/>
+    <p:sldId id="265" r:id="rId11"/>
+    <p:sldId id="266" r:id="rId12"/>
   </p:sldIdLst>
   <p:sldSz cx="12192000" cy="6858000"/>
   <p:notesSz cx="6858000" cy="9144000"/>
@@ -125,6 +126,7 @@
             <p14:sldId id="259"/>
             <p14:sldId id="260"/>
             <p14:sldId id="262"/>
+            <p14:sldId id="267"/>
             <p14:sldId id="263"/>
             <p14:sldId id="265"/>
             <p14:sldId id="266"/>
@@ -3092,6 +3094,139 @@
             <p:ph type="title"/>
           </p:nvPr>
         </p:nvSpPr>
+        <p:spPr/>
+        <p:txBody>
+          <a:bodyPr/>
+          <a:lstStyle/>
+          <a:p>
+            <a:r>
+              <a:rPr lang="zh-CN" altLang="en-US" dirty="0" smtClean="0"/>
+              <a:t>货运流程</a:t>
+            </a:r>
+            <a:r>
+              <a:rPr lang="en-US" altLang="zh-CN" dirty="0" smtClean="0"/>
+              <a:t>(Procurement Process)</a:t>
+            </a:r>
+            <a:endParaRPr lang="zh-CN" altLang="en-US" dirty="0"/>
+          </a:p>
+        </p:txBody>
+      </p:sp>
+      <p:sp>
+        <p:nvSpPr>
+          <p:cNvPr id="3" name="内容占位符 2"/>
+          <p:cNvSpPr>
+            <a:spLocks noGrp="1"/>
+          </p:cNvSpPr>
+          <p:nvPr>
+            <p:ph idx="1"/>
+          </p:nvPr>
+        </p:nvSpPr>
+        <p:spPr/>
+        <p:txBody>
+          <a:bodyPr/>
+          <a:lstStyle/>
+          <a:p>
+            <a:r>
+              <a:rPr lang="zh-CN" altLang="en-US" dirty="0" smtClean="0"/>
+              <a:t>目前状态</a:t>
+            </a:r>
+            <a:r>
+              <a:rPr lang="en-US" altLang="zh-CN" dirty="0" smtClean="0"/>
+              <a:t>(Current Status)</a:t>
+            </a:r>
+          </a:p>
+          <a:p>
+            <a:pPr lvl="1"/>
+            <a:r>
+              <a:rPr lang="zh-CN" altLang="en-US" dirty="0"/>
+              <a:t>供应</a:t>
+            </a:r>
+            <a:r>
+              <a:rPr lang="zh-CN" altLang="en-US" dirty="0" smtClean="0"/>
+              <a:t>商自行备货、发货、配送，并向平台推送“已发货”通知</a:t>
+            </a:r>
+            <a:endParaRPr lang="en-US" altLang="zh-CN" dirty="0"/>
+          </a:p>
+          <a:p>
+            <a:pPr lvl="1"/>
+            <a:r>
+              <a:rPr lang="zh-CN" altLang="en-US" dirty="0" smtClean="0"/>
+              <a:t>修理厂收货及验货完毕后，告知平台“已收货”</a:t>
+            </a:r>
+            <a:endParaRPr lang="en-US" altLang="zh-CN" dirty="0" smtClean="0"/>
+          </a:p>
+          <a:p>
+            <a:r>
+              <a:rPr lang="zh-CN" altLang="en-US" dirty="0" smtClean="0"/>
+              <a:t>未来愿景</a:t>
+            </a:r>
+            <a:r>
+              <a:rPr lang="en-US" altLang="zh-CN" dirty="0" smtClean="0"/>
+              <a:t>(Prospect)</a:t>
+            </a:r>
+          </a:p>
+          <a:p>
+            <a:pPr lvl="1"/>
+            <a:r>
+              <a:rPr lang="zh-CN" altLang="en-US" dirty="0" smtClean="0"/>
+              <a:t>平台在各省自建实体中心仓库，供应商将部分货物（货权仍归属供应商）存储在中心仓，由平台物流统一配送</a:t>
+            </a:r>
+            <a:endParaRPr lang="en-US" altLang="zh-CN" dirty="0" smtClean="0"/>
+          </a:p>
+          <a:p>
+            <a:pPr lvl="1"/>
+            <a:r>
+              <a:rPr lang="zh-CN" altLang="en-US" dirty="0" smtClean="0"/>
+              <a:t>建立云仓系统，实时管理供应商虚拟库存</a:t>
+            </a:r>
+            <a:endParaRPr lang="en-US" altLang="zh-CN" dirty="0" smtClean="0"/>
+          </a:p>
+          <a:p>
+            <a:pPr lvl="1"/>
+            <a:endParaRPr lang="zh-CN" altLang="en-US" dirty="0"/>
+          </a:p>
+        </p:txBody>
+      </p:sp>
+    </p:spTree>
+    <p:extLst>
+      <p:ext uri="{BB962C8B-B14F-4D97-AF65-F5344CB8AC3E}">
+        <p14:creationId xmlns:p14="http://schemas.microsoft.com/office/powerpoint/2010/main" val="4118894032"/>
+      </p:ext>
+    </p:extLst>
+  </p:cSld>
+  <p:clrMapOvr>
+    <a:masterClrMapping/>
+  </p:clrMapOvr>
+</p:sld>
+</file>
+
+<file path=ppt/slides/slide11.xml><?xml version="1.0" encoding="utf-8"?>
+<p:sld xmlns:a="http://schemas.openxmlformats.org/drawingml/2006/main" xmlns:r="http://schemas.openxmlformats.org/officeDocument/2006/relationships" xmlns:p="http://schemas.openxmlformats.org/presentationml/2006/main">
+  <p:cSld>
+    <p:spTree>
+      <p:nvGrpSpPr>
+        <p:cNvPr id="1" name=""/>
+        <p:cNvGrpSpPr/>
+        <p:nvPr/>
+      </p:nvGrpSpPr>
+      <p:grpSpPr>
+        <a:xfrm>
+          <a:off x="0" y="0"/>
+          <a:ext cx="0" cy="0"/>
+          <a:chOff x="0" y="0"/>
+          <a:chExt cx="0" cy="0"/>
+        </a:xfrm>
+      </p:grpSpPr>
+      <p:sp>
+        <p:nvSpPr>
+          <p:cNvPr id="2" name="标题 1"/>
+          <p:cNvSpPr>
+            <a:spLocks noGrp="1"/>
+          </p:cNvSpPr>
+          <p:nvPr>
+            <p:ph type="title"/>
+          </p:nvPr>
+        </p:nvSpPr>
         <p:spPr>
           <a:xfrm>
             <a:off x="678809" y="2688875"/>
@@ -4033,16 +4168,26 @@
           </a:xfrm>
         </p:spPr>
         <p:txBody>
-          <a:bodyPr/>
-          <a:lstStyle/>
-          <a:p>
-            <a:r>
-              <a:rPr lang="zh-CN" altLang="en-US" dirty="0" smtClean="0"/>
-              <a:t>供应商 </a:t>
-            </a:r>
-            <a:r>
-              <a:rPr lang="en-US" altLang="zh-CN" dirty="0" smtClean="0"/>
-              <a:t>(Supplier)</a:t>
+          <a:bodyPr>
+            <a:normAutofit fontScale="90000"/>
+          </a:bodyPr>
+          <a:lstStyle/>
+          <a:p>
+            <a:r>
+              <a:rPr lang="zh-CN" altLang="en-US" dirty="0" smtClean="0"/>
+              <a:t>供应</a:t>
+            </a:r>
+            <a:r>
+              <a:rPr lang="zh-CN" altLang="en-US" dirty="0" smtClean="0"/>
+              <a:t>商签约流程 </a:t>
+            </a:r>
+            <a:r>
+              <a:rPr lang="en-US" altLang="zh-CN" dirty="0" smtClean="0"/>
+              <a:t>(</a:t>
+            </a:r>
+            <a:r>
+              <a:rPr lang="en-US" altLang="zh-CN" dirty="0" smtClean="0"/>
+              <a:t>Supplier Registration Process)</a:t>
             </a:r>
             <a:endParaRPr lang="en-US" dirty="0"/>
           </a:p>
@@ -4831,16 +4976,12 @@
           <a:lstStyle/>
           <a:p>
             <a:r>
-              <a:rPr lang="zh-CN" altLang="en-US" dirty="0"/>
-              <a:t>订单</a:t>
-            </a:r>
-            <a:r>
-              <a:rPr lang="zh-CN" altLang="en-US" dirty="0" smtClean="0"/>
-              <a:t>跟踪</a:t>
-            </a:r>
-            <a:r>
-              <a:rPr lang="en-US" altLang="zh-CN" dirty="0" smtClean="0"/>
-              <a:t>(Orders Tracking)</a:t>
+              <a:rPr lang="zh-CN" altLang="en-US" dirty="0" smtClean="0"/>
+              <a:t>供应商选择</a:t>
+            </a:r>
+            <a:r>
+              <a:rPr lang="en-US" altLang="zh-CN" dirty="0" smtClean="0"/>
+              <a:t>(Choosing Suppliers)</a:t>
             </a:r>
             <a:endParaRPr lang="zh-CN" altLang="en-US" dirty="0"/>
           </a:p>
@@ -4863,99 +5004,89 @@
           <a:p>
             <a:r>
               <a:rPr lang="zh-CN" altLang="en-US" dirty="0" smtClean="0"/>
-              <a:t>采购</a:t>
-            </a:r>
-            <a:r>
-              <a:rPr lang="en-US" altLang="zh-CN" dirty="0" smtClean="0"/>
-              <a:t>(Purchasing)</a:t>
+              <a:t>匹配规则</a:t>
+            </a:r>
+            <a:r>
+              <a:rPr lang="en-US" altLang="zh-CN" dirty="0" smtClean="0"/>
+              <a:t>(Matching rules)</a:t>
             </a:r>
           </a:p>
           <a:p>
             <a:pPr lvl="1"/>
             <a:r>
               <a:rPr lang="zh-CN" altLang="en-US" dirty="0" smtClean="0"/>
-              <a:t>由供应链团队开发全国及本地供应商</a:t>
-            </a:r>
-            <a:r>
-              <a:rPr lang="en-US" altLang="zh-CN" dirty="0" smtClean="0"/>
-              <a:t>——</a:t>
-            </a:r>
-            <a:r>
-              <a:rPr lang="zh-CN" altLang="en-US" dirty="0" smtClean="0"/>
-              <a:t>约</a:t>
-            </a:r>
-            <a:r>
-              <a:rPr lang="en-US" altLang="zh-CN" dirty="0" smtClean="0"/>
-              <a:t>5</a:t>
-            </a:r>
-            <a:r>
-              <a:rPr lang="zh-CN" altLang="en-US" dirty="0" smtClean="0"/>
-              <a:t>人</a:t>
-            </a:r>
-            <a:r>
-              <a:rPr lang="en-US" altLang="zh-CN" dirty="0" smtClean="0"/>
-              <a:t>(5 FTEs)</a:t>
-            </a:r>
+              <a:t>部分修理厂有指定供应商，当修理厂发起询价后，系统会自动匹配</a:t>
+            </a:r>
+            <a:endParaRPr lang="en-US" altLang="zh-CN" dirty="0" smtClean="0"/>
           </a:p>
           <a:p>
             <a:pPr lvl="1"/>
             <a:r>
               <a:rPr lang="zh-CN" altLang="en-US" dirty="0" smtClean="0"/>
-              <a:t>由当地客户经理负责与修理厂沟通下单购买</a:t>
-            </a:r>
-            <a:r>
-              <a:rPr lang="en-US" altLang="zh-CN" dirty="0" smtClean="0"/>
-              <a:t>——</a:t>
-            </a:r>
-            <a:r>
-              <a:rPr lang="zh-CN" altLang="en-US" dirty="0" smtClean="0"/>
-              <a:t>每地市一人</a:t>
+              <a:t>根据汽车品牌</a:t>
+            </a:r>
+            <a:r>
+              <a:rPr lang="en-US" altLang="zh-CN" dirty="0" smtClean="0"/>
+              <a:t>(Car Brand)</a:t>
+            </a:r>
+            <a:r>
+              <a:rPr lang="zh-CN" altLang="en-US" dirty="0" smtClean="0"/>
+              <a:t>匹配供应商</a:t>
+            </a:r>
+            <a:endParaRPr lang="en-US" altLang="zh-CN" dirty="0"/>
+          </a:p>
+          <a:p>
+            <a:r>
+              <a:rPr lang="zh-CN" altLang="en-US" dirty="0" smtClean="0"/>
+              <a:t>报价确认规则</a:t>
+            </a:r>
+            <a:r>
+              <a:rPr lang="en-US" altLang="zh-CN" dirty="0" smtClean="0"/>
+              <a:t>(Quotation Confirmation Rules)</a:t>
+            </a:r>
+          </a:p>
+          <a:p>
+            <a:pPr lvl="1"/>
+            <a:r>
+              <a:rPr lang="zh-CN" altLang="en-US" dirty="0" smtClean="0"/>
+              <a:t>根据定损单数据，原则上所有零件报价必须低于理赔定损价格</a:t>
             </a:r>
             <a:endParaRPr lang="en-US" altLang="zh-CN" dirty="0" smtClean="0"/>
           </a:p>
           <a:p>
-            <a:r>
-              <a:rPr lang="zh-CN" altLang="en-US" dirty="0" smtClean="0"/>
-              <a:t>跟踪</a:t>
-            </a:r>
-            <a:r>
-              <a:rPr lang="en-US" altLang="zh-CN" dirty="0" smtClean="0"/>
-              <a:t>(Tracking)</a:t>
-            </a:r>
-          </a:p>
-          <a:p>
             <a:pPr lvl="1"/>
             <a:r>
               <a:rPr lang="zh-CN" altLang="en-US" dirty="0" smtClean="0"/>
-              <a:t>由接单客服人员跟踪修理厂下单后的支付、物流等流程</a:t>
-            </a:r>
-            <a:r>
-              <a:rPr lang="en-US" altLang="zh-CN" dirty="0" smtClean="0"/>
-              <a:t>——</a:t>
-            </a:r>
-            <a:r>
-              <a:rPr lang="zh-CN" altLang="en-US" dirty="0" smtClean="0"/>
-              <a:t>约</a:t>
-            </a:r>
-            <a:r>
-              <a:rPr lang="en-US" altLang="zh-CN" dirty="0" smtClean="0"/>
-              <a:t>10-15</a:t>
-            </a:r>
-            <a:r>
-              <a:rPr lang="zh-CN" altLang="en-US" dirty="0" smtClean="0"/>
-              <a:t>人</a:t>
-            </a:r>
-            <a:r>
-              <a:rPr lang="en-US" altLang="zh-CN" dirty="0" smtClean="0"/>
-              <a:t>(Customer Service Center)</a:t>
-            </a:r>
+              <a:t>查询该供应商历史报价数据，判断其报价是否合理</a:t>
+            </a:r>
+            <a:endParaRPr lang="en-US" altLang="zh-CN" dirty="0" smtClean="0"/>
+          </a:p>
+          <a:p>
+            <a:pPr lvl="1"/>
+            <a:r>
+              <a:rPr lang="zh-CN" altLang="en-US" dirty="0" smtClean="0"/>
+              <a:t>由专家客服最终判定选取哪家供应商</a:t>
+            </a:r>
+            <a:endParaRPr lang="en-US" altLang="zh-CN" dirty="0" smtClean="0"/>
+          </a:p>
+          <a:p>
+            <a:pPr lvl="1"/>
+            <a:r>
+              <a:rPr lang="zh-CN" altLang="en-US" dirty="0" smtClean="0"/>
+              <a:t>报价返回理赔后，若存在报价不合理的现象，则重复上述流程重新选择供应商</a:t>
+            </a:r>
+            <a:endParaRPr lang="en-US" altLang="zh-CN" dirty="0" smtClean="0"/>
+          </a:p>
+          <a:p>
+            <a:pPr lvl="1"/>
+            <a:endParaRPr lang="en-US" altLang="zh-CN" dirty="0" smtClean="0"/>
           </a:p>
         </p:txBody>
       </p:sp>
     </p:spTree>
     <p:extLst>
       <p:ext uri="{BB962C8B-B14F-4D97-AF65-F5344CB8AC3E}">
-        <p14:creationId xmlns:p14="http://schemas.microsoft.com/office/powerpoint/2010/main" val="2266711927"/>
+        <p14:creationId xmlns:p14="http://schemas.microsoft.com/office/powerpoint/2010/main" val="3643884727"/>
       </p:ext>
     </p:extLst>
   </p:cSld>
@@ -4998,12 +5129,16 @@
           <a:lstStyle/>
           <a:p>
             <a:r>
-              <a:rPr lang="zh-CN" altLang="en-US" dirty="0" smtClean="0"/>
-              <a:t>货运流程</a:t>
-            </a:r>
-            <a:r>
-              <a:rPr lang="en-US" altLang="zh-CN" dirty="0" smtClean="0"/>
-              <a:t>(Procurement Process)</a:t>
+              <a:rPr lang="zh-CN" altLang="en-US" dirty="0"/>
+              <a:t>订单</a:t>
+            </a:r>
+            <a:r>
+              <a:rPr lang="zh-CN" altLang="en-US" dirty="0" smtClean="0"/>
+              <a:t>跟踪</a:t>
+            </a:r>
+            <a:r>
+              <a:rPr lang="en-US" altLang="zh-CN" dirty="0" smtClean="0"/>
+              <a:t>(Orders Tracking)</a:t>
             </a:r>
             <a:endParaRPr lang="zh-CN" altLang="en-US" dirty="0"/>
           </a:p>
@@ -5026,69 +5161,99 @@
           <a:p>
             <a:r>
               <a:rPr lang="zh-CN" altLang="en-US" dirty="0" smtClean="0"/>
-              <a:t>目前状态</a:t>
-            </a:r>
-            <a:r>
-              <a:rPr lang="en-US" altLang="zh-CN" dirty="0" smtClean="0"/>
-              <a:t>(Current Status)</a:t>
+              <a:t>采购</a:t>
+            </a:r>
+            <a:r>
+              <a:rPr lang="en-US" altLang="zh-CN" dirty="0" smtClean="0"/>
+              <a:t>(Purchasing)</a:t>
             </a:r>
           </a:p>
           <a:p>
             <a:pPr lvl="1"/>
             <a:r>
-              <a:rPr lang="zh-CN" altLang="en-US" dirty="0"/>
-              <a:t>供应</a:t>
-            </a:r>
-            <a:r>
-              <a:rPr lang="zh-CN" altLang="en-US" dirty="0" smtClean="0"/>
-              <a:t>商自行备货、发货、配送，并向平台推送“已发货”通知</a:t>
-            </a:r>
-            <a:endParaRPr lang="en-US" altLang="zh-CN" dirty="0"/>
+              <a:rPr lang="zh-CN" altLang="en-US" dirty="0" smtClean="0"/>
+              <a:t>由供应链团队开发全国及本地供应商</a:t>
+            </a:r>
+            <a:r>
+              <a:rPr lang="en-US" altLang="zh-CN" dirty="0" smtClean="0"/>
+              <a:t>——</a:t>
+            </a:r>
+            <a:r>
+              <a:rPr lang="zh-CN" altLang="en-US" dirty="0" smtClean="0"/>
+              <a:t>约</a:t>
+            </a:r>
+            <a:r>
+              <a:rPr lang="en-US" altLang="zh-CN" dirty="0" smtClean="0"/>
+              <a:t>5</a:t>
+            </a:r>
+            <a:r>
+              <a:rPr lang="zh-CN" altLang="en-US" dirty="0" smtClean="0"/>
+              <a:t>人</a:t>
+            </a:r>
+            <a:r>
+              <a:rPr lang="en-US" altLang="zh-CN" dirty="0" smtClean="0"/>
+              <a:t>(5 FTEs)</a:t>
+            </a:r>
           </a:p>
           <a:p>
             <a:pPr lvl="1"/>
             <a:r>
               <a:rPr lang="zh-CN" altLang="en-US" dirty="0" smtClean="0"/>
-              <a:t>修理厂收货及验货完毕后，告知平台“已收货”</a:t>
+              <a:t>由当地客户经理负责与修理厂沟通下单购买</a:t>
+            </a:r>
+            <a:r>
+              <a:rPr lang="en-US" altLang="zh-CN" dirty="0" smtClean="0"/>
+              <a:t>——</a:t>
+            </a:r>
+            <a:r>
+              <a:rPr lang="zh-CN" altLang="en-US" dirty="0" smtClean="0"/>
+              <a:t>每地市一人</a:t>
             </a:r>
             <a:endParaRPr lang="en-US" altLang="zh-CN" dirty="0" smtClean="0"/>
           </a:p>
           <a:p>
             <a:r>
               <a:rPr lang="zh-CN" altLang="en-US" dirty="0" smtClean="0"/>
-              <a:t>未来愿景</a:t>
-            </a:r>
-            <a:r>
-              <a:rPr lang="en-US" altLang="zh-CN" dirty="0" smtClean="0"/>
-              <a:t>(Prospect)</a:t>
+              <a:t>跟踪</a:t>
+            </a:r>
+            <a:r>
+              <a:rPr lang="en-US" altLang="zh-CN" dirty="0" smtClean="0"/>
+              <a:t>(Tracking)</a:t>
             </a:r>
           </a:p>
           <a:p>
             <a:pPr lvl="1"/>
             <a:r>
               <a:rPr lang="zh-CN" altLang="en-US" dirty="0" smtClean="0"/>
-              <a:t>平台在各省自建实体中心仓库，供应商将部分货物（货权仍归属供应商）存储在中心仓，由平台物流统一配送</a:t>
-            </a:r>
-            <a:endParaRPr lang="en-US" altLang="zh-CN" dirty="0" smtClean="0"/>
-          </a:p>
-          <a:p>
-            <a:pPr lvl="1"/>
-            <a:r>
-              <a:rPr lang="zh-CN" altLang="en-US" dirty="0" smtClean="0"/>
-              <a:t>建立云仓系统，实时管理供应商虚拟库存</a:t>
-            </a:r>
-            <a:endParaRPr lang="en-US" altLang="zh-CN" dirty="0" smtClean="0"/>
-          </a:p>
-          <a:p>
-            <a:pPr lvl="1"/>
-            <a:endParaRPr lang="zh-CN" altLang="en-US" dirty="0"/>
+              <a:t>由接单客服人员跟踪修理厂下单后的支付、物流等流程</a:t>
+            </a:r>
+            <a:r>
+              <a:rPr lang="en-US" altLang="zh-CN" dirty="0" smtClean="0"/>
+              <a:t>——</a:t>
+            </a:r>
+            <a:r>
+              <a:rPr lang="zh-CN" altLang="en-US" dirty="0" smtClean="0"/>
+              <a:t>约</a:t>
+            </a:r>
+            <a:r>
+              <a:rPr lang="en-US" altLang="zh-CN" dirty="0" smtClean="0"/>
+              <a:t>10-15</a:t>
+            </a:r>
+            <a:r>
+              <a:rPr lang="zh-CN" altLang="en-US" dirty="0" smtClean="0"/>
+              <a:t>人</a:t>
+            </a:r>
+            <a:r>
+              <a:rPr lang="en-US" altLang="zh-CN" dirty="0" smtClean="0"/>
+              <a:t>(Customer Service Center)</a:t>
+            </a:r>
           </a:p>
         </p:txBody>
       </p:sp>
     </p:spTree>
     <p:extLst>
       <p:ext uri="{BB962C8B-B14F-4D97-AF65-F5344CB8AC3E}">
-        <p14:creationId xmlns:p14="http://schemas.microsoft.com/office/powerpoint/2010/main" val="4118894032"/>
+        <p14:creationId xmlns:p14="http://schemas.microsoft.com/office/powerpoint/2010/main" val="2266711927"/>
       </p:ext>
     </p:extLst>
   </p:cSld>
@@ -5353,7 +5518,7 @@
   <a:extraClrSchemeLst/>
   <a:extLst>
     <a:ext uri="{05A4C25C-085E-4340-85A3-A5531E510DB2}">
-      <thm15:themeFamily xmlns:thm15="http://schemas.microsoft.com/office/thememl/2012/main" xmlns="" name="Office Theme" id="{62F939B6-93AF-4DB8-9C6B-D6C7DFDC589F}" vid="{4A3C46E8-61CC-4603-A589-7422A47A8E4A}"/>
+      <thm15:themeFamily xmlns="" xmlns:thm15="http://schemas.microsoft.com/office/thememl/2012/main" name="Office Theme" id="{62F939B6-93AF-4DB8-9C6B-D6C7DFDC589F}" vid="{4A3C46E8-61CC-4603-A589-7422A47A8E4A}"/>
     </a:ext>
   </a:extLst>
 </a:theme>

</xml_diff>